<commit_message>
Final update to preso
</commit_message>
<xml_diff>
--- a/2017_SCALE15/SCaLE-ConSchedAndSDSChangeCloud-PDF.pptx
+++ b/2017_SCALE15/SCaLE-ConSchedAndSDSChangeCloud-PDF.pptx
@@ -5,51 +5,52 @@
     <p:sldMasterId id="2147484469" r:id="rId4"/>
   </p:sldMasterIdLst>
   <p:notesMasterIdLst>
-    <p:notesMasterId r:id="rId39"/>
+    <p:notesMasterId r:id="rId40"/>
   </p:notesMasterIdLst>
   <p:handoutMasterIdLst>
-    <p:handoutMasterId r:id="rId40"/>
+    <p:handoutMasterId r:id="rId41"/>
   </p:handoutMasterIdLst>
   <p:sldIdLst>
     <p:sldId id="307" r:id="rId5"/>
     <p:sldId id="325" r:id="rId6"/>
     <p:sldId id="344" r:id="rId7"/>
-    <p:sldId id="345" r:id="rId8"/>
+    <p:sldId id="382" r:id="rId8"/>
     <p:sldId id="342" r:id="rId9"/>
     <p:sldId id="380" r:id="rId10"/>
     <p:sldId id="381" r:id="rId11"/>
-    <p:sldId id="319" r:id="rId12"/>
-    <p:sldId id="367" r:id="rId13"/>
-    <p:sldId id="372" r:id="rId14"/>
-    <p:sldId id="328" r:id="rId15"/>
-    <p:sldId id="371" r:id="rId16"/>
-    <p:sldId id="334" r:id="rId17"/>
-    <p:sldId id="365" r:id="rId18"/>
-    <p:sldId id="337" r:id="rId19"/>
-    <p:sldId id="355" r:id="rId20"/>
-    <p:sldId id="346" r:id="rId21"/>
-    <p:sldId id="356" r:id="rId22"/>
-    <p:sldId id="368" r:id="rId23"/>
-    <p:sldId id="369" r:id="rId24"/>
-    <p:sldId id="340" r:id="rId25"/>
-    <p:sldId id="357" r:id="rId26"/>
-    <p:sldId id="354" r:id="rId27"/>
-    <p:sldId id="374" r:id="rId28"/>
-    <p:sldId id="376" r:id="rId29"/>
-    <p:sldId id="379" r:id="rId30"/>
-    <p:sldId id="377" r:id="rId31"/>
-    <p:sldId id="360" r:id="rId32"/>
-    <p:sldId id="358" r:id="rId33"/>
-    <p:sldId id="361" r:id="rId34"/>
-    <p:sldId id="364" r:id="rId35"/>
-    <p:sldId id="324" r:id="rId36"/>
-    <p:sldId id="322" r:id="rId37"/>
-    <p:sldId id="366" r:id="rId38"/>
+    <p:sldId id="383" r:id="rId12"/>
+    <p:sldId id="319" r:id="rId13"/>
+    <p:sldId id="367" r:id="rId14"/>
+    <p:sldId id="372" r:id="rId15"/>
+    <p:sldId id="328" r:id="rId16"/>
+    <p:sldId id="371" r:id="rId17"/>
+    <p:sldId id="334" r:id="rId18"/>
+    <p:sldId id="365" r:id="rId19"/>
+    <p:sldId id="337" r:id="rId20"/>
+    <p:sldId id="355" r:id="rId21"/>
+    <p:sldId id="384" r:id="rId22"/>
+    <p:sldId id="356" r:id="rId23"/>
+    <p:sldId id="368" r:id="rId24"/>
+    <p:sldId id="369" r:id="rId25"/>
+    <p:sldId id="340" r:id="rId26"/>
+    <p:sldId id="357" r:id="rId27"/>
+    <p:sldId id="354" r:id="rId28"/>
+    <p:sldId id="374" r:id="rId29"/>
+    <p:sldId id="376" r:id="rId30"/>
+    <p:sldId id="379" r:id="rId31"/>
+    <p:sldId id="377" r:id="rId32"/>
+    <p:sldId id="360" r:id="rId33"/>
+    <p:sldId id="358" r:id="rId34"/>
+    <p:sldId id="361" r:id="rId35"/>
+    <p:sldId id="364" r:id="rId36"/>
+    <p:sldId id="324" r:id="rId37"/>
+    <p:sldId id="322" r:id="rId38"/>
+    <p:sldId id="366" r:id="rId39"/>
   </p:sldIdLst>
   <p:sldSz cx="9144000" cy="5143500" type="screen16x9"/>
   <p:notesSz cx="7010400" cy="9296400"/>
   <p:custDataLst>
-    <p:tags r:id="rId41"/>
+    <p:tags r:id="rId42"/>
   </p:custDataLst>
   <p:defaultTextStyle>
     <a:defPPr>
@@ -853,7 +854,7 @@
               <a:pPr>
                 <a:defRPr/>
               </a:pPr>
-              <a:t>12</a:t>
+              <a:t>13</a:t>
             </a:fld>
             <a:endParaRPr lang="en-US" dirty="0"/>
           </a:p>
@@ -943,7 +944,7 @@
               <a:pPr>
                 <a:defRPr/>
               </a:pPr>
-              <a:t>18</a:t>
+              <a:t>19</a:t>
             </a:fld>
             <a:endParaRPr lang="en-US" dirty="0"/>
           </a:p>
@@ -1033,7 +1034,7 @@
               <a:pPr>
                 <a:defRPr/>
               </a:pPr>
-              <a:t>25</a:t>
+              <a:t>26</a:t>
             </a:fld>
             <a:endParaRPr lang="en-US" dirty="0"/>
           </a:p>
@@ -1123,7 +1124,7 @@
               <a:pPr>
                 <a:defRPr/>
               </a:pPr>
-              <a:t>26</a:t>
+              <a:t>27</a:t>
             </a:fld>
             <a:endParaRPr lang="en-US" dirty="0"/>
           </a:p>
@@ -5555,7 +5556,7 @@
                   <a:schemeClr val="bg1"/>
                 </a:buClr>
               </a:pPr>
-              <a:t>2/22/17</a:t>
+              <a:t>2/23/2017</a:t>
             </a:fld>
             <a:endParaRPr lang="en-US" sz="900" dirty="0" smtClean="0">
               <a:solidFill>
@@ -5629,7 +5630,7 @@
                   <a:schemeClr val="bg1"/>
                 </a:buClr>
               </a:pPr>
-              <a:t>2/22/17</a:t>
+              <a:t>2/23/2017</a:t>
             </a:fld>
             <a:endParaRPr lang="en-US" sz="900" dirty="0" smtClean="0">
               <a:solidFill>
@@ -6721,6 +6722,235 @@
           <a:p>
             <a:r>
               <a:rPr lang="en-US" dirty="0" smtClean="0"/>
+              <a:t>What is a Scheduler?</a:t>
+            </a:r>
+            <a:endParaRPr lang="en-US" dirty="0"/>
+          </a:p>
+        </p:txBody>
+      </p:sp>
+      <p:sp>
+        <p:nvSpPr>
+          <p:cNvPr id="4" name="Content Placeholder 3"/>
+          <p:cNvSpPr>
+            <a:spLocks noGrp="1"/>
+          </p:cNvSpPr>
+          <p:nvPr>
+            <p:ph sz="half" idx="1"/>
+          </p:nvPr>
+        </p:nvSpPr>
+        <p:spPr>
+          <a:xfrm>
+            <a:off x="274319" y="1280159"/>
+            <a:ext cx="4722759" cy="3455361"/>
+          </a:xfrm>
+        </p:spPr>
+        <p:txBody>
+          <a:bodyPr/>
+          <a:lstStyle/>
+          <a:p>
+            <a:r>
+              <a:rPr lang="en-US" dirty="0" smtClean="0"/>
+              <a:t>Fair and efficient workload placement</a:t>
+            </a:r>
+          </a:p>
+          <a:p>
+            <a:r>
+              <a:rPr lang="en-US" dirty="0" smtClean="0"/>
+              <a:t>Adhering to a set of constraints</a:t>
+            </a:r>
+          </a:p>
+          <a:p>
+            <a:r>
+              <a:rPr lang="en-US" dirty="0" smtClean="0"/>
+              <a:t>Quickly (and deterministically) dispatching jobs</a:t>
+            </a:r>
+          </a:p>
+          <a:p>
+            <a:r>
+              <a:rPr lang="en-US" dirty="0" smtClean="0"/>
+              <a:t>Robust and tolerates errors</a:t>
+            </a:r>
+            <a:endParaRPr lang="en-US" dirty="0"/>
+          </a:p>
+        </p:txBody>
+      </p:sp>
+      <p:pic>
+        <p:nvPicPr>
+          <p:cNvPr id="5" name="Content Placeholder 3"/>
+          <p:cNvPicPr>
+            <a:picLocks noChangeAspect="1"/>
+          </p:cNvPicPr>
+          <p:nvPr/>
+        </p:nvPicPr>
+        <p:blipFill>
+          <a:blip r:embed="rId2" cstate="print">
+            <a:extLst>
+              <a:ext uri="{28A0092B-C50C-407E-A947-70E740481C1C}">
+                <a14:useLocalDpi xmlns:a14="http://schemas.microsoft.com/office/drawing/2010/main" val="0"/>
+              </a:ext>
+            </a:extLst>
+          </a:blip>
+          <a:stretch>
+            <a:fillRect/>
+          </a:stretch>
+        </p:blipFill>
+        <p:spPr>
+          <a:xfrm>
+            <a:off x="5151382" y="1796088"/>
+            <a:ext cx="1977659" cy="925544"/>
+          </a:xfrm>
+          <a:prstGeom prst="rect">
+            <a:avLst/>
+          </a:prstGeom>
+        </p:spPr>
+      </p:pic>
+      <p:pic>
+        <p:nvPicPr>
+          <p:cNvPr id="6" name="Picture 5"/>
+          <p:cNvPicPr>
+            <a:picLocks noChangeAspect="1"/>
+          </p:cNvPicPr>
+          <p:nvPr/>
+        </p:nvPicPr>
+        <p:blipFill>
+          <a:blip r:embed="rId3" cstate="print">
+            <a:extLst>
+              <a:ext uri="{28A0092B-C50C-407E-A947-70E740481C1C}">
+                <a14:useLocalDpi xmlns:a14="http://schemas.microsoft.com/office/drawing/2010/main" val="0"/>
+              </a:ext>
+            </a:extLst>
+          </a:blip>
+          <a:stretch>
+            <a:fillRect/>
+          </a:stretch>
+        </p:blipFill>
+        <p:spPr>
+          <a:xfrm>
+            <a:off x="7245263" y="1586064"/>
+            <a:ext cx="1686514" cy="1493770"/>
+          </a:xfrm>
+          <a:prstGeom prst="rect">
+            <a:avLst/>
+          </a:prstGeom>
+        </p:spPr>
+      </p:pic>
+      <p:pic>
+        <p:nvPicPr>
+          <p:cNvPr id="7" name="Picture 6"/>
+          <p:cNvPicPr>
+            <a:picLocks noChangeAspect="1"/>
+          </p:cNvPicPr>
+          <p:nvPr/>
+        </p:nvPicPr>
+        <p:blipFill>
+          <a:blip r:embed="rId4">
+            <a:extLst>
+              <a:ext uri="{28A0092B-C50C-407E-A947-70E740481C1C}">
+                <a14:useLocalDpi xmlns:a14="http://schemas.microsoft.com/office/drawing/2010/main" val="0"/>
+              </a:ext>
+            </a:extLst>
+          </a:blip>
+          <a:stretch>
+            <a:fillRect/>
+          </a:stretch>
+        </p:blipFill>
+        <p:spPr>
+          <a:xfrm>
+            <a:off x="5040964" y="2943319"/>
+            <a:ext cx="2033286" cy="1541481"/>
+          </a:xfrm>
+          <a:prstGeom prst="rect">
+            <a:avLst/>
+          </a:prstGeom>
+        </p:spPr>
+      </p:pic>
+      <p:pic>
+        <p:nvPicPr>
+          <p:cNvPr id="8" name="Picture 7"/>
+          <p:cNvPicPr>
+            <a:picLocks noChangeAspect="1"/>
+          </p:cNvPicPr>
+          <p:nvPr/>
+        </p:nvPicPr>
+        <p:blipFill>
+          <a:blip r:embed="rId5" cstate="print">
+            <a:extLst>
+              <a:ext uri="{28A0092B-C50C-407E-A947-70E740481C1C}">
+                <a14:useLocalDpi xmlns:a14="http://schemas.microsoft.com/office/drawing/2010/main" val="0"/>
+              </a:ext>
+            </a:extLst>
+          </a:blip>
+          <a:stretch>
+            <a:fillRect/>
+          </a:stretch>
+        </p:blipFill>
+        <p:spPr>
+          <a:xfrm>
+            <a:off x="7082006" y="3278780"/>
+            <a:ext cx="1842130" cy="958265"/>
+          </a:xfrm>
+          <a:prstGeom prst="rect">
+            <a:avLst/>
+          </a:prstGeom>
+        </p:spPr>
+      </p:pic>
+    </p:spTree>
+    <p:extLst>
+      <p:ext uri="{BB962C8B-B14F-4D97-AF65-F5344CB8AC3E}">
+        <p14:creationId xmlns:p14="http://schemas.microsoft.com/office/powerpoint/2010/main" val="1888563960"/>
+      </p:ext>
+    </p:extLst>
+  </p:cSld>
+  <p:clrMapOvr>
+    <a:masterClrMapping/>
+  </p:clrMapOvr>
+  <p:transition spd="med">
+    <p:wipe dir="r"/>
+  </p:transition>
+  <p:timing>
+    <p:tnLst>
+      <p:par>
+        <p:cTn id="1" dur="indefinite" restart="never" nodeType="tmRoot"/>
+      </p:par>
+    </p:tnLst>
+  </p:timing>
+</p:sld>
+</file>
+
+<file path=ppt/slides/slide11.xml><?xml version="1.0" encoding="utf-8"?>
+<p:sld xmlns:a="http://schemas.openxmlformats.org/drawingml/2006/main" xmlns:r="http://schemas.openxmlformats.org/officeDocument/2006/relationships" xmlns:p="http://schemas.openxmlformats.org/presentationml/2006/main">
+  <p:cSld>
+    <p:spTree>
+      <p:nvGrpSpPr>
+        <p:cNvPr id="1" name=""/>
+        <p:cNvGrpSpPr/>
+        <p:nvPr/>
+      </p:nvGrpSpPr>
+      <p:grpSpPr>
+        <a:xfrm>
+          <a:off x="0" y="0"/>
+          <a:ext cx="0" cy="0"/>
+          <a:chOff x="0" y="0"/>
+          <a:chExt cx="0" cy="0"/>
+        </a:xfrm>
+      </p:grpSpPr>
+      <p:sp>
+        <p:nvSpPr>
+          <p:cNvPr id="2" name="Title 1"/>
+          <p:cNvSpPr>
+            <a:spLocks noGrp="1"/>
+          </p:cNvSpPr>
+          <p:nvPr>
+            <p:ph type="title"/>
+          </p:nvPr>
+        </p:nvSpPr>
+        <p:spPr/>
+        <p:txBody>
+          <a:bodyPr/>
+          <a:lstStyle/>
+          <a:p>
+            <a:r>
+              <a:rPr lang="en-US" dirty="0" smtClean="0"/>
               <a:t>Scheduling Work</a:t>
             </a:r>
             <a:endParaRPr lang="en-US" dirty="0"/>
@@ -6916,7 +7146,7 @@
 </p:sld>
 </file>
 
-<file path=ppt/slides/slide11.xml><?xml version="1.0" encoding="utf-8"?>
+<file path=ppt/slides/slide12.xml><?xml version="1.0" encoding="utf-8"?>
 <p:sld xmlns:a="http://schemas.openxmlformats.org/drawingml/2006/main" xmlns:r="http://schemas.openxmlformats.org/officeDocument/2006/relationships" xmlns:p="http://schemas.openxmlformats.org/presentationml/2006/main">
   <p:cSld>
     <p:spTree>
@@ -7092,7 +7322,7 @@
 </p:sld>
 </file>
 
-<file path=ppt/slides/slide12.xml><?xml version="1.0" encoding="utf-8"?>
+<file path=ppt/slides/slide13.xml><?xml version="1.0" encoding="utf-8"?>
 <p:sld xmlns:a="http://schemas.openxmlformats.org/drawingml/2006/main" xmlns:r="http://schemas.openxmlformats.org/officeDocument/2006/relationships" xmlns:p="http://schemas.openxmlformats.org/presentationml/2006/main">
   <p:cSld>
     <p:spTree>
@@ -7184,7 +7414,7 @@
 </p:sld>
 </file>
 
-<file path=ppt/slides/slide13.xml><?xml version="1.0" encoding="utf-8"?>
+<file path=ppt/slides/slide14.xml><?xml version="1.0" encoding="utf-8"?>
 <p:sld xmlns:a="http://schemas.openxmlformats.org/drawingml/2006/main" xmlns:r="http://schemas.openxmlformats.org/officeDocument/2006/relationships" xmlns:p="http://schemas.openxmlformats.org/presentationml/2006/main">
   <p:cSld>
     <p:spTree>
@@ -7813,7 +8043,7 @@
 </p:sld>
 </file>
 
-<file path=ppt/slides/slide14.xml><?xml version="1.0" encoding="utf-8"?>
+<file path=ppt/slides/slide15.xml><?xml version="1.0" encoding="utf-8"?>
 <p:sld xmlns:a="http://schemas.openxmlformats.org/drawingml/2006/main" xmlns:r="http://schemas.openxmlformats.org/officeDocument/2006/relationships" xmlns:p="http://schemas.openxmlformats.org/presentationml/2006/main">
   <p:cSld>
     <p:spTree>
@@ -7905,7 +8135,7 @@
 </p:sld>
 </file>
 
-<file path=ppt/slides/slide15.xml><?xml version="1.0" encoding="utf-8"?>
+<file path=ppt/slides/slide16.xml><?xml version="1.0" encoding="utf-8"?>
 <p:sld xmlns:a="http://schemas.openxmlformats.org/drawingml/2006/main" xmlns:r="http://schemas.openxmlformats.org/officeDocument/2006/relationships" xmlns:p="http://schemas.openxmlformats.org/presentationml/2006/main">
   <p:cSld>
     <p:spTree>
@@ -7975,7 +8205,7 @@
 </p:sld>
 </file>
 
-<file path=ppt/slides/slide16.xml><?xml version="1.0" encoding="utf-8"?>
+<file path=ppt/slides/slide17.xml><?xml version="1.0" encoding="utf-8"?>
 <p:sld xmlns:a="http://schemas.openxmlformats.org/drawingml/2006/main" xmlns:r="http://schemas.openxmlformats.org/officeDocument/2006/relationships" xmlns:p="http://schemas.openxmlformats.org/presentationml/2006/main">
   <p:cSld>
     <p:spTree>
@@ -8127,7 +8357,7 @@
 </p:sld>
 </file>
 
-<file path=ppt/slides/slide17.xml><?xml version="1.0" encoding="utf-8"?>
+<file path=ppt/slides/slide18.xml><?xml version="1.0" encoding="utf-8"?>
 <p:sld xmlns:a="http://schemas.openxmlformats.org/drawingml/2006/main" xmlns:r="http://schemas.openxmlformats.org/officeDocument/2006/relationships" xmlns:p="http://schemas.openxmlformats.org/presentationml/2006/main">
   <p:cSld>
     <p:spTree>
@@ -8180,9 +8410,15 @@
         <p:spPr/>
         <p:txBody>
           <a:bodyPr>
-            <a:normAutofit lnSpcReduction="10000"/>
+            <a:normAutofit fontScale="92500" lnSpcReduction="20000"/>
           </a:bodyPr>
           <a:lstStyle/>
+          <a:p>
+            <a:r>
+              <a:rPr lang="en-US" dirty="0" smtClean="0"/>
+              <a:t>Software-based Storage Platform</a:t>
+            </a:r>
+          </a:p>
           <a:p>
             <a:r>
               <a:rPr lang="en-US" dirty="0" smtClean="0"/>
@@ -8255,7 +8491,7 @@
         </p:blipFill>
         <p:spPr>
           <a:xfrm>
-            <a:off x="4608513" y="1473200"/>
+            <a:off x="4114526" y="1799021"/>
             <a:ext cx="3810000" cy="1231900"/>
           </a:xfrm>
           <a:prstGeom prst="rect">
@@ -8266,7 +8502,7 @@
     </p:spTree>
     <p:extLst>
       <p:ext uri="{BB962C8B-B14F-4D97-AF65-F5344CB8AC3E}">
-        <p14:creationId xmlns:p14="http://schemas.microsoft.com/office/powerpoint/2010/main" val="2146524078"/>
+        <p14:creationId xmlns:p14="http://schemas.microsoft.com/office/powerpoint/2010/main" val="2983000706"/>
       </p:ext>
     </p:extLst>
   </p:cSld>
@@ -8286,7 +8522,7 @@
 </p:sld>
 </file>
 
-<file path=ppt/slides/slide18.xml><?xml version="1.0" encoding="utf-8"?>
+<file path=ppt/slides/slide19.xml><?xml version="1.0" encoding="utf-8"?>
 <p:sld xmlns:a="http://schemas.openxmlformats.org/drawingml/2006/main" xmlns:r="http://schemas.openxmlformats.org/officeDocument/2006/relationships" xmlns:p="http://schemas.openxmlformats.org/presentationml/2006/main">
   <p:cSld>
     <p:spTree>
@@ -8679,7 +8915,129 @@
 </p:sld>
 </file>
 
-<file path=ppt/slides/slide19.xml><?xml version="1.0" encoding="utf-8"?>
+<file path=ppt/slides/slide2.xml><?xml version="1.0" encoding="utf-8"?>
+<p:sld xmlns:a="http://schemas.openxmlformats.org/drawingml/2006/main" xmlns:r="http://schemas.openxmlformats.org/officeDocument/2006/relationships" xmlns:p="http://schemas.openxmlformats.org/presentationml/2006/main">
+  <p:cSld>
+    <p:spTree>
+      <p:nvGrpSpPr>
+        <p:cNvPr id="1" name=""/>
+        <p:cNvGrpSpPr/>
+        <p:nvPr/>
+      </p:nvGrpSpPr>
+      <p:grpSpPr>
+        <a:xfrm>
+          <a:off x="0" y="0"/>
+          <a:ext cx="0" cy="0"/>
+          <a:chOff x="0" y="0"/>
+          <a:chExt cx="0" cy="0"/>
+        </a:xfrm>
+      </p:grpSpPr>
+      <p:sp>
+        <p:nvSpPr>
+          <p:cNvPr id="2" name="Title 1"/>
+          <p:cNvSpPr>
+            <a:spLocks noGrp="1"/>
+          </p:cNvSpPr>
+          <p:nvPr>
+            <p:ph type="title"/>
+          </p:nvPr>
+        </p:nvSpPr>
+        <p:spPr/>
+        <p:txBody>
+          <a:bodyPr/>
+          <a:lstStyle/>
+          <a:p>
+            <a:r>
+              <a:rPr lang="en-US" dirty="0" smtClean="0"/>
+              <a:t>Agenda</a:t>
+            </a:r>
+            <a:endParaRPr lang="en-US" dirty="0"/>
+          </a:p>
+        </p:txBody>
+      </p:sp>
+      <p:sp>
+        <p:nvSpPr>
+          <p:cNvPr id="4" name="Content Placeholder 3"/>
+          <p:cNvSpPr>
+            <a:spLocks noGrp="1"/>
+          </p:cNvSpPr>
+          <p:nvPr>
+            <p:ph sz="half" idx="1"/>
+          </p:nvPr>
+        </p:nvSpPr>
+        <p:spPr/>
+        <p:txBody>
+          <a:bodyPr/>
+          <a:lstStyle/>
+          <a:p>
+            <a:r>
+              <a:rPr lang="en-US" dirty="0" smtClean="0"/>
+              <a:t>Review of Software-Defined Storage</a:t>
+            </a:r>
+          </a:p>
+          <a:p>
+            <a:r>
+              <a:rPr lang="en-US" dirty="0" smtClean="0"/>
+              <a:t>Container Schedulers</a:t>
+            </a:r>
+          </a:p>
+          <a:p>
+            <a:r>
+              <a:rPr lang="en-US" dirty="0"/>
+              <a:t>Schedulers </a:t>
+            </a:r>
+            <a:r>
+              <a:rPr lang="en-US" dirty="0" smtClean="0"/>
+              <a:t>+ </a:t>
+            </a:r>
+            <a:r>
+              <a:rPr lang="en-US" dirty="0"/>
+              <a:t>Software-Defined </a:t>
+            </a:r>
+            <a:r>
+              <a:rPr lang="en-US" dirty="0" smtClean="0"/>
+              <a:t>Storage = Awesome!</a:t>
+            </a:r>
+          </a:p>
+          <a:p>
+            <a:r>
+              <a:rPr lang="en-US" dirty="0" smtClean="0"/>
+              <a:t>To the Cloud!!</a:t>
+            </a:r>
+          </a:p>
+          <a:p>
+            <a:r>
+              <a:rPr lang="en-US" dirty="0" smtClean="0"/>
+              <a:t>Demo</a:t>
+            </a:r>
+            <a:endParaRPr lang="en-US" dirty="0"/>
+          </a:p>
+        </p:txBody>
+      </p:sp>
+    </p:spTree>
+    <p:extLst>
+      <p:ext uri="{BB962C8B-B14F-4D97-AF65-F5344CB8AC3E}">
+        <p14:creationId xmlns:p14="http://schemas.microsoft.com/office/powerpoint/2010/main" val="1894828202"/>
+      </p:ext>
+    </p:extLst>
+  </p:cSld>
+  <p:clrMapOvr>
+    <a:masterClrMapping/>
+  </p:clrMapOvr>
+  <p:transition spd="med">
+    <p:wipe dir="r"/>
+  </p:transition>
+  <p:timing>
+    <p:tnLst>
+      <p:par>
+        <p:cTn id="1" dur="indefinite" restart="never" nodeType="tmRoot"/>
+      </p:par>
+    </p:tnLst>
+  </p:timing>
+</p:sld>
+</file>
+
+<file path=ppt/slides/slide20.xml><?xml version="1.0" encoding="utf-8"?>
 <p:sld xmlns:a="http://schemas.openxmlformats.org/drawingml/2006/main" xmlns:r="http://schemas.openxmlformats.org/officeDocument/2006/relationships" xmlns:p="http://schemas.openxmlformats.org/presentationml/2006/main">
   <p:cSld>
     <p:spTree>
@@ -8808,129 +9166,7 @@
 </p:sld>
 </file>
 
-<file path=ppt/slides/slide2.xml><?xml version="1.0" encoding="utf-8"?>
-<p:sld xmlns:a="http://schemas.openxmlformats.org/drawingml/2006/main" xmlns:r="http://schemas.openxmlformats.org/officeDocument/2006/relationships" xmlns:p="http://schemas.openxmlformats.org/presentationml/2006/main">
-  <p:cSld>
-    <p:spTree>
-      <p:nvGrpSpPr>
-        <p:cNvPr id="1" name=""/>
-        <p:cNvGrpSpPr/>
-        <p:nvPr/>
-      </p:nvGrpSpPr>
-      <p:grpSpPr>
-        <a:xfrm>
-          <a:off x="0" y="0"/>
-          <a:ext cx="0" cy="0"/>
-          <a:chOff x="0" y="0"/>
-          <a:chExt cx="0" cy="0"/>
-        </a:xfrm>
-      </p:grpSpPr>
-      <p:sp>
-        <p:nvSpPr>
-          <p:cNvPr id="2" name="Title 1"/>
-          <p:cNvSpPr>
-            <a:spLocks noGrp="1"/>
-          </p:cNvSpPr>
-          <p:nvPr>
-            <p:ph type="title"/>
-          </p:nvPr>
-        </p:nvSpPr>
-        <p:spPr/>
-        <p:txBody>
-          <a:bodyPr/>
-          <a:lstStyle/>
-          <a:p>
-            <a:r>
-              <a:rPr lang="en-US" dirty="0" smtClean="0"/>
-              <a:t>Agenda</a:t>
-            </a:r>
-            <a:endParaRPr lang="en-US" dirty="0"/>
-          </a:p>
-        </p:txBody>
-      </p:sp>
-      <p:sp>
-        <p:nvSpPr>
-          <p:cNvPr id="4" name="Content Placeholder 3"/>
-          <p:cNvSpPr>
-            <a:spLocks noGrp="1"/>
-          </p:cNvSpPr>
-          <p:nvPr>
-            <p:ph sz="half" idx="1"/>
-          </p:nvPr>
-        </p:nvSpPr>
-        <p:spPr/>
-        <p:txBody>
-          <a:bodyPr/>
-          <a:lstStyle/>
-          <a:p>
-            <a:r>
-              <a:rPr lang="en-US" dirty="0" smtClean="0"/>
-              <a:t>Review of Software-Defined Storage</a:t>
-            </a:r>
-          </a:p>
-          <a:p>
-            <a:r>
-              <a:rPr lang="en-US" dirty="0" smtClean="0"/>
-              <a:t>Container Schedulers</a:t>
-            </a:r>
-          </a:p>
-          <a:p>
-            <a:r>
-              <a:rPr lang="en-US" dirty="0"/>
-              <a:t>Schedulers </a:t>
-            </a:r>
-            <a:r>
-              <a:rPr lang="en-US" dirty="0" smtClean="0"/>
-              <a:t>+ </a:t>
-            </a:r>
-            <a:r>
-              <a:rPr lang="en-US" dirty="0"/>
-              <a:t>Software-Defined </a:t>
-            </a:r>
-            <a:r>
-              <a:rPr lang="en-US" dirty="0" smtClean="0"/>
-              <a:t>Storage = Awesome!</a:t>
-            </a:r>
-          </a:p>
-          <a:p>
-            <a:r>
-              <a:rPr lang="en-US" dirty="0" smtClean="0"/>
-              <a:t>To the Cloud!!</a:t>
-            </a:r>
-          </a:p>
-          <a:p>
-            <a:r>
-              <a:rPr lang="en-US" dirty="0" smtClean="0"/>
-              <a:t>Demo</a:t>
-            </a:r>
-            <a:endParaRPr lang="en-US" dirty="0"/>
-          </a:p>
-        </p:txBody>
-      </p:sp>
-    </p:spTree>
-    <p:extLst>
-      <p:ext uri="{BB962C8B-B14F-4D97-AF65-F5344CB8AC3E}">
-        <p14:creationId xmlns:p14="http://schemas.microsoft.com/office/powerpoint/2010/main" val="1894828202"/>
-      </p:ext>
-    </p:extLst>
-  </p:cSld>
-  <p:clrMapOvr>
-    <a:masterClrMapping/>
-  </p:clrMapOvr>
-  <p:transition spd="med">
-    <p:wipe dir="r"/>
-  </p:transition>
-  <p:timing>
-    <p:tnLst>
-      <p:par>
-        <p:cTn id="1" dur="indefinite" restart="never" nodeType="tmRoot"/>
-      </p:par>
-    </p:tnLst>
-  </p:timing>
-</p:sld>
-</file>
-
-<file path=ppt/slides/slide20.xml><?xml version="1.0" encoding="utf-8"?>
+<file path=ppt/slides/slide21.xml><?xml version="1.0" encoding="utf-8"?>
 <p:sld xmlns:a="http://schemas.openxmlformats.org/drawingml/2006/main" xmlns:r="http://schemas.openxmlformats.org/officeDocument/2006/relationships" xmlns:p="http://schemas.openxmlformats.org/presentationml/2006/main">
   <p:cSld>
     <p:spTree>
@@ -9777,7 +10013,7 @@
 </p:sld>
 </file>
 
-<file path=ppt/slides/slide21.xml><?xml version="1.0" encoding="utf-8"?>
+<file path=ppt/slides/slide22.xml><?xml version="1.0" encoding="utf-8"?>
 <p:sld xmlns:a="http://schemas.openxmlformats.org/drawingml/2006/main" xmlns:r="http://schemas.openxmlformats.org/officeDocument/2006/relationships" xmlns:p="http://schemas.openxmlformats.org/presentationml/2006/main">
   <p:cSld>
     <p:spTree>
@@ -10012,7 +10248,7 @@
 </p:sld>
 </file>
 
-<file path=ppt/slides/slide22.xml><?xml version="1.0" encoding="utf-8"?>
+<file path=ppt/slides/slide23.xml><?xml version="1.0" encoding="utf-8"?>
 <p:sld xmlns:a="http://schemas.openxmlformats.org/drawingml/2006/main" xmlns:r="http://schemas.openxmlformats.org/officeDocument/2006/relationships" xmlns:p="http://schemas.openxmlformats.org/presentationml/2006/main">
   <p:cSld>
     <p:spTree>
@@ -10182,7 +10418,7 @@
 </p:sld>
 </file>
 
-<file path=ppt/slides/slide23.xml><?xml version="1.0" encoding="utf-8"?>
+<file path=ppt/slides/slide24.xml><?xml version="1.0" encoding="utf-8"?>
 <p:sld xmlns:a="http://schemas.openxmlformats.org/drawingml/2006/main" xmlns:r="http://schemas.openxmlformats.org/officeDocument/2006/relationships" xmlns:p="http://schemas.openxmlformats.org/presentationml/2006/main">
   <p:cSld>
     <p:spTree>
@@ -10251,7 +10487,7 @@
 </p:sld>
 </file>
 
-<file path=ppt/slides/slide24.xml><?xml version="1.0" encoding="utf-8"?>
+<file path=ppt/slides/slide25.xml><?xml version="1.0" encoding="utf-8"?>
 <p:sld xmlns:a="http://schemas.openxmlformats.org/drawingml/2006/main" xmlns:r="http://schemas.openxmlformats.org/officeDocument/2006/relationships" xmlns:p="http://schemas.openxmlformats.org/presentationml/2006/main">
   <p:cSld>
     <p:spTree>
@@ -10385,7 +10621,7 @@
 </p:sld>
 </file>
 
-<file path=ppt/slides/slide25.xml><?xml version="1.0" encoding="utf-8"?>
+<file path=ppt/slides/slide26.xml><?xml version="1.0" encoding="utf-8"?>
 <p:sld xmlns:a="http://schemas.openxmlformats.org/drawingml/2006/main" xmlns:r="http://schemas.openxmlformats.org/officeDocument/2006/relationships" xmlns:p="http://schemas.openxmlformats.org/presentationml/2006/main">
   <p:cSld>
     <p:spTree>
@@ -10525,7 +10761,7 @@
 </p:sld>
 </file>
 
-<file path=ppt/slides/slide26.xml><?xml version="1.0" encoding="utf-8"?>
+<file path=ppt/slides/slide27.xml><?xml version="1.0" encoding="utf-8"?>
 <p:sld xmlns:a="http://schemas.openxmlformats.org/drawingml/2006/main" xmlns:r="http://schemas.openxmlformats.org/officeDocument/2006/relationships" xmlns:p="http://schemas.openxmlformats.org/presentationml/2006/main">
   <p:cSld>
     <p:spTree>
@@ -10697,7 +10933,7 @@
 </p:sld>
 </file>
 
-<file path=ppt/slides/slide27.xml><?xml version="1.0" encoding="utf-8"?>
+<file path=ppt/slides/slide28.xml><?xml version="1.0" encoding="utf-8"?>
 <p:sld xmlns:a="http://schemas.openxmlformats.org/drawingml/2006/main" xmlns:r="http://schemas.openxmlformats.org/officeDocument/2006/relationships" xmlns:p="http://schemas.openxmlformats.org/presentationml/2006/main">
   <p:cSld>
     <p:spTree>
@@ -10793,71 +11029,6 @@
     <p:extLst>
       <p:ext uri="{BB962C8B-B14F-4D97-AF65-F5344CB8AC3E}">
         <p14:creationId xmlns:p14="http://schemas.microsoft.com/office/powerpoint/2010/main" val="1020661597"/>
-      </p:ext>
-    </p:extLst>
-  </p:cSld>
-  <p:clrMapOvr>
-    <a:masterClrMapping/>
-  </p:clrMapOvr>
-  <p:transition spd="med">
-    <p:wipe dir="r"/>
-  </p:transition>
-  <p:timing>
-    <p:tnLst>
-      <p:par>
-        <p:cTn id="1" dur="indefinite" restart="never" nodeType="tmRoot"/>
-      </p:par>
-    </p:tnLst>
-  </p:timing>
-</p:sld>
-</file>
-
-<file path=ppt/slides/slide28.xml><?xml version="1.0" encoding="utf-8"?>
-<p:sld xmlns:a="http://schemas.openxmlformats.org/drawingml/2006/main" xmlns:r="http://schemas.openxmlformats.org/officeDocument/2006/relationships" xmlns:p="http://schemas.openxmlformats.org/presentationml/2006/main">
-  <p:cSld>
-    <p:spTree>
-      <p:nvGrpSpPr>
-        <p:cNvPr id="1" name=""/>
-        <p:cNvGrpSpPr/>
-        <p:nvPr/>
-      </p:nvGrpSpPr>
-      <p:grpSpPr>
-        <a:xfrm>
-          <a:off x="0" y="0"/>
-          <a:ext cx="0" cy="0"/>
-          <a:chOff x="0" y="0"/>
-          <a:chExt cx="0" cy="0"/>
-        </a:xfrm>
-      </p:grpSpPr>
-      <p:sp>
-        <p:nvSpPr>
-          <p:cNvPr id="2" name="Title 1"/>
-          <p:cNvSpPr>
-            <a:spLocks noGrp="1"/>
-          </p:cNvSpPr>
-          <p:nvPr>
-            <p:ph type="title"/>
-          </p:nvPr>
-        </p:nvSpPr>
-        <p:spPr/>
-        <p:txBody>
-          <a:bodyPr>
-            <a:normAutofit/>
-          </a:bodyPr>
-          <a:lstStyle/>
-          <a:p>
-            <a:r>
-              <a:rPr lang="en-US" dirty="0" smtClean="0"/>
-              <a:t>Demo</a:t>
-            </a:r>
-            <a:endParaRPr lang="en-US" dirty="0"/>
-          </a:p>
-        </p:txBody>
-      </p:sp>
-    </p:spTree>
-    <p:extLst>
-      <p:ext uri="{BB962C8B-B14F-4D97-AF65-F5344CB8AC3E}">
-        <p14:creationId xmlns:p14="http://schemas.microsoft.com/office/powerpoint/2010/main" val="1076951828"/>
       </p:ext>
     </p:extLst>
   </p:cSld>
@@ -10906,29 +11077,6 @@
         </p:nvSpPr>
         <p:spPr/>
         <p:txBody>
-          <a:bodyPr/>
-          <a:lstStyle/>
-          <a:p>
-            <a:r>
-              <a:rPr lang="en-US" dirty="0" smtClean="0"/>
-              <a:t>Configuration</a:t>
-            </a:r>
-            <a:endParaRPr lang="en-US" dirty="0"/>
-          </a:p>
-        </p:txBody>
-      </p:sp>
-      <p:sp>
-        <p:nvSpPr>
-          <p:cNvPr id="4" name="Content Placeholder 3"/>
-          <p:cNvSpPr>
-            <a:spLocks noGrp="1"/>
-          </p:cNvSpPr>
-          <p:nvPr>
-            <p:ph sz="half" idx="1"/>
-          </p:nvPr>
-        </p:nvSpPr>
-        <p:spPr/>
-        <p:txBody>
           <a:bodyPr>
             <a:normAutofit/>
           </a:bodyPr>
@@ -10936,77 +11084,16 @@
           <a:p>
             <a:r>
               <a:rPr lang="en-US" dirty="0" smtClean="0"/>
-              <a:t>Mesos Configuration</a:t>
-            </a:r>
-          </a:p>
-          <a:p>
-            <a:pPr lvl="1"/>
-            <a:r>
-              <a:rPr lang="en-US" dirty="0" smtClean="0"/>
-              <a:t>3 Node Mesos Cluster (Management)</a:t>
-            </a:r>
-          </a:p>
-          <a:p>
-            <a:pPr lvl="1"/>
-            <a:r>
-              <a:rPr lang="en-US" dirty="0"/>
-              <a:t>3</a:t>
-            </a:r>
-            <a:r>
-              <a:rPr lang="en-US" dirty="0" smtClean="0"/>
-              <a:t> Mesos Agent nodes (Compute)</a:t>
-            </a:r>
-          </a:p>
-          <a:p>
-            <a:r>
-              <a:rPr lang="en-US" dirty="0" smtClean="0"/>
-              <a:t>ScaleIO Cluster (Scale-out storage)</a:t>
-            </a:r>
-          </a:p>
-          <a:p>
-            <a:pPr lvl="1"/>
-            <a:r>
-              <a:rPr lang="en-US" dirty="0" smtClean="0"/>
-              <a:t>Will install on top of 3 Mesos Agent nodes</a:t>
-            </a:r>
-          </a:p>
-          <a:p>
-            <a:pPr lvl="1"/>
-            <a:r>
-              <a:rPr lang="en-US" dirty="0" smtClean="0"/>
-              <a:t>180 GB local disks on </a:t>
-            </a:r>
-            <a:r>
-              <a:rPr lang="en-US" u="sng" dirty="0" smtClean="0"/>
-              <a:t>each</a:t>
-            </a:r>
-            <a:r>
-              <a:rPr lang="en-US" dirty="0" smtClean="0"/>
-              <a:t> node to make up this </a:t>
-            </a:r>
-            <a:r>
-              <a:rPr lang="en-US" dirty="0"/>
-              <a:t>S</a:t>
-            </a:r>
-            <a:r>
-              <a:rPr lang="en-US" dirty="0" smtClean="0"/>
-              <a:t>torage </a:t>
-            </a:r>
-            <a:r>
-              <a:rPr lang="en-US" dirty="0"/>
-              <a:t>P</a:t>
-            </a:r>
-            <a:r>
-              <a:rPr lang="en-US" dirty="0" smtClean="0"/>
-              <a:t>ool</a:t>
-            </a:r>
+              <a:t>Demo</a:t>
+            </a:r>
+            <a:endParaRPr lang="en-US" dirty="0"/>
           </a:p>
         </p:txBody>
       </p:sp>
     </p:spTree>
     <p:extLst>
       <p:ext uri="{BB962C8B-B14F-4D97-AF65-F5344CB8AC3E}">
-        <p14:creationId xmlns:p14="http://schemas.microsoft.com/office/powerpoint/2010/main" val="803194016"/>
+        <p14:creationId xmlns:p14="http://schemas.microsoft.com/office/powerpoint/2010/main" val="1076951828"/>
       </p:ext>
     </p:extLst>
   </p:cSld>
@@ -11137,6 +11224,155 @@
           <a:p>
             <a:r>
               <a:rPr lang="en-US" dirty="0" smtClean="0"/>
+              <a:t>Configuration</a:t>
+            </a:r>
+            <a:endParaRPr lang="en-US" dirty="0"/>
+          </a:p>
+        </p:txBody>
+      </p:sp>
+      <p:sp>
+        <p:nvSpPr>
+          <p:cNvPr id="4" name="Content Placeholder 3"/>
+          <p:cNvSpPr>
+            <a:spLocks noGrp="1"/>
+          </p:cNvSpPr>
+          <p:nvPr>
+            <p:ph sz="half" idx="1"/>
+          </p:nvPr>
+        </p:nvSpPr>
+        <p:spPr/>
+        <p:txBody>
+          <a:bodyPr>
+            <a:normAutofit/>
+          </a:bodyPr>
+          <a:lstStyle/>
+          <a:p>
+            <a:r>
+              <a:rPr lang="en-US" dirty="0" smtClean="0"/>
+              <a:t>Mesos Configuration</a:t>
+            </a:r>
+          </a:p>
+          <a:p>
+            <a:pPr lvl="1"/>
+            <a:r>
+              <a:rPr lang="en-US" dirty="0" smtClean="0"/>
+              <a:t>3 Node Mesos Cluster (Management)</a:t>
+            </a:r>
+          </a:p>
+          <a:p>
+            <a:pPr lvl="1"/>
+            <a:r>
+              <a:rPr lang="en-US" dirty="0"/>
+              <a:t>3</a:t>
+            </a:r>
+            <a:r>
+              <a:rPr lang="en-US" dirty="0" smtClean="0"/>
+              <a:t> Mesos Agent nodes (Compute)</a:t>
+            </a:r>
+          </a:p>
+          <a:p>
+            <a:r>
+              <a:rPr lang="en-US" dirty="0" smtClean="0"/>
+              <a:t>ScaleIO Cluster (Scale-out storage)</a:t>
+            </a:r>
+          </a:p>
+          <a:p>
+            <a:pPr lvl="1"/>
+            <a:r>
+              <a:rPr lang="en-US" dirty="0" smtClean="0"/>
+              <a:t>Will install on top of 3 Mesos Agent nodes</a:t>
+            </a:r>
+          </a:p>
+          <a:p>
+            <a:pPr lvl="1"/>
+            <a:r>
+              <a:rPr lang="en-US" dirty="0" smtClean="0"/>
+              <a:t>180 GB local disks on </a:t>
+            </a:r>
+            <a:r>
+              <a:rPr lang="en-US" u="sng" dirty="0" smtClean="0"/>
+              <a:t>each</a:t>
+            </a:r>
+            <a:r>
+              <a:rPr lang="en-US" dirty="0" smtClean="0"/>
+              <a:t> node to make up this </a:t>
+            </a:r>
+            <a:r>
+              <a:rPr lang="en-US" dirty="0"/>
+              <a:t>S</a:t>
+            </a:r>
+            <a:r>
+              <a:rPr lang="en-US" dirty="0" smtClean="0"/>
+              <a:t>torage </a:t>
+            </a:r>
+            <a:r>
+              <a:rPr lang="en-US" dirty="0"/>
+              <a:t>P</a:t>
+            </a:r>
+            <a:r>
+              <a:rPr lang="en-US" dirty="0" smtClean="0"/>
+              <a:t>ool</a:t>
+            </a:r>
+          </a:p>
+        </p:txBody>
+      </p:sp>
+    </p:spTree>
+    <p:extLst>
+      <p:ext uri="{BB962C8B-B14F-4D97-AF65-F5344CB8AC3E}">
+        <p14:creationId xmlns:p14="http://schemas.microsoft.com/office/powerpoint/2010/main" val="803194016"/>
+      </p:ext>
+    </p:extLst>
+  </p:cSld>
+  <p:clrMapOvr>
+    <a:masterClrMapping/>
+  </p:clrMapOvr>
+  <p:transition spd="med">
+    <p:wipe dir="r"/>
+  </p:transition>
+  <p:timing>
+    <p:tnLst>
+      <p:par>
+        <p:cTn id="1" dur="indefinite" restart="never" nodeType="tmRoot"/>
+      </p:par>
+    </p:tnLst>
+  </p:timing>
+</p:sld>
+</file>
+
+<file path=ppt/slides/slide31.xml><?xml version="1.0" encoding="utf-8"?>
+<p:sld xmlns:a="http://schemas.openxmlformats.org/drawingml/2006/main" xmlns:r="http://schemas.openxmlformats.org/officeDocument/2006/relationships" xmlns:p="http://schemas.openxmlformats.org/presentationml/2006/main">
+  <p:cSld>
+    <p:spTree>
+      <p:nvGrpSpPr>
+        <p:cNvPr id="1" name=""/>
+        <p:cNvGrpSpPr/>
+        <p:nvPr/>
+      </p:nvGrpSpPr>
+      <p:grpSpPr>
+        <a:xfrm>
+          <a:off x="0" y="0"/>
+          <a:ext cx="0" cy="0"/>
+          <a:chOff x="0" y="0"/>
+          <a:chExt cx="0" cy="0"/>
+        </a:xfrm>
+      </p:grpSpPr>
+      <p:sp>
+        <p:nvSpPr>
+          <p:cNvPr id="2" name="Title 1"/>
+          <p:cNvSpPr>
+            <a:spLocks noGrp="1"/>
+          </p:cNvSpPr>
+          <p:nvPr>
+            <p:ph type="title"/>
+          </p:nvPr>
+        </p:nvSpPr>
+        <p:spPr/>
+        <p:txBody>
+          <a:bodyPr/>
+          <a:lstStyle/>
+          <a:p>
+            <a:r>
+              <a:rPr lang="en-US" dirty="0" smtClean="0"/>
               <a:t>Configuration (Cont.)</a:t>
             </a:r>
             <a:endParaRPr lang="en-US" dirty="0"/>
@@ -11254,7 +11490,7 @@
 </p:sld>
 </file>
 
-<file path=ppt/slides/slide31.xml><?xml version="1.0" encoding="utf-8"?>
+<file path=ppt/slides/slide32.xml><?xml version="1.0" encoding="utf-8"?>
 <p:sld xmlns:a="http://schemas.openxmlformats.org/drawingml/2006/main" xmlns:r="http://schemas.openxmlformats.org/officeDocument/2006/relationships" xmlns:p="http://schemas.openxmlformats.org/presentationml/2006/main">
   <p:cSld>
     <p:spTree>
@@ -12571,7 +12807,7 @@
 </p:sld>
 </file>
 
-<file path=ppt/slides/slide32.xml><?xml version="1.0" encoding="utf-8"?>
+<file path=ppt/slides/slide33.xml><?xml version="1.0" encoding="utf-8"?>
 <p:sld xmlns:a="http://schemas.openxmlformats.org/drawingml/2006/main" xmlns:r="http://schemas.openxmlformats.org/officeDocument/2006/relationships" xmlns:p="http://schemas.openxmlformats.org/presentationml/2006/main">
   <p:cSld>
     <p:spTree>
@@ -12611,7 +12847,7 @@
 </p:sld>
 </file>
 
-<file path=ppt/slides/slide33.xml><?xml version="1.0" encoding="utf-8"?>
+<file path=ppt/slides/slide34.xml><?xml version="1.0" encoding="utf-8"?>
 <p:sld xmlns:a="http://schemas.openxmlformats.org/drawingml/2006/main" xmlns:r="http://schemas.openxmlformats.org/officeDocument/2006/relationships" xmlns:p="http://schemas.openxmlformats.org/presentationml/2006/main">
   <p:cSld>
     <p:spTree>
@@ -12651,7 +12887,7 @@
 </p:sld>
 </file>
 
-<file path=ppt/slides/slide34.xml><?xml version="1.0" encoding="utf-8"?>
+<file path=ppt/slides/slide35.xml><?xml version="1.0" encoding="utf-8"?>
 <p:sld xmlns:a="http://schemas.openxmlformats.org/drawingml/2006/main" xmlns:r="http://schemas.openxmlformats.org/officeDocument/2006/relationships" xmlns:p="http://schemas.openxmlformats.org/presentationml/2006/main" show="0">
   <p:cSld>
     <p:spTree>
@@ -12758,13 +12994,6 @@
             </a:r>
           </a:p>
           <a:p>
-            <a:pPr lvl="1"/>
-            <a:r>
-              <a:rPr lang="en-US" dirty="0" smtClean="0"/>
-              <a:t>Installed software versus Physical Storage Arrays</a:t>
-            </a:r>
-          </a:p>
-          <a:p>
             <a:r>
               <a:rPr lang="en-US" dirty="0" smtClean="0"/>
               <a:t>Provides a (programmatic) mechanism to provision storage</a:t>
@@ -12773,20 +13002,21 @@
           <a:p>
             <a:r>
               <a:rPr lang="en-US" dirty="0" smtClean="0"/>
-              <a:t>Varying degrees of SDS: NFS, </a:t>
-            </a:r>
-            <a:r>
-              <a:rPr lang="en-US" smtClean="0"/>
-              <a:t>VMware VSAN</a:t>
-            </a:r>
-            <a:endParaRPr lang="en-US" dirty="0" smtClean="0"/>
+              <a:t>Varying degrees of SDS: NFS, VMware VSAN</a:t>
+            </a:r>
+          </a:p>
+          <a:p>
+            <a:r>
+              <a:rPr lang="en-US" dirty="0" smtClean="0"/>
+              <a:t>NFS, VSAN are Software-based Storage Platforms!</a:t>
+            </a:r>
           </a:p>
         </p:txBody>
       </p:sp>
     </p:spTree>
     <p:extLst>
       <p:ext uri="{BB962C8B-B14F-4D97-AF65-F5344CB8AC3E}">
-        <p14:creationId xmlns:p14="http://schemas.microsoft.com/office/powerpoint/2010/main" val="214222453"/>
+        <p14:creationId xmlns:p14="http://schemas.microsoft.com/office/powerpoint/2010/main" val="3505936002"/>
       </p:ext>
     </p:extLst>
   </p:cSld>
@@ -13127,30 +13357,105 @@
         </p:nvSpPr>
         <p:spPr/>
         <p:txBody>
-          <a:bodyPr>
-            <a:normAutofit fontScale="90000"/>
-          </a:bodyPr>
+          <a:bodyPr/>
           <a:lstStyle/>
           <a:p>
             <a:r>
               <a:rPr lang="en-US" dirty="0" smtClean="0"/>
-              <a:t>Container</a:t>
-            </a:r>
-            <a:br>
-              <a:rPr lang="en-US" dirty="0" smtClean="0"/>
-            </a:br>
-            <a:r>
-              <a:rPr lang="en-US" dirty="0" smtClean="0"/>
-              <a:t>Schedulers</a:t>
+              <a:t>NFS &amp; VSAN are different</a:t>
+            </a:r>
+            <a:r>
+              <a:rPr lang="mr-IN" dirty="0" smtClean="0"/>
+              <a:t>…</a:t>
             </a:r>
             <a:endParaRPr lang="en-US" dirty="0"/>
           </a:p>
         </p:txBody>
       </p:sp>
+      <p:sp>
+        <p:nvSpPr>
+          <p:cNvPr id="4" name="Content Placeholder 3"/>
+          <p:cNvSpPr>
+            <a:spLocks noGrp="1"/>
+          </p:cNvSpPr>
+          <p:nvPr>
+            <p:ph sz="half" idx="1"/>
+          </p:nvPr>
+        </p:nvSpPr>
+        <p:spPr>
+          <a:xfrm>
+            <a:off x="274320" y="1280159"/>
+            <a:ext cx="6000356" cy="3375923"/>
+          </a:xfrm>
+        </p:spPr>
+        <p:txBody>
+          <a:bodyPr/>
+          <a:lstStyle/>
+          <a:p>
+            <a:r>
+              <a:rPr lang="en-US" dirty="0" smtClean="0"/>
+              <a:t>What makes NFS</a:t>
+            </a:r>
+            <a:r>
+              <a:rPr lang="en-US" dirty="0"/>
+              <a:t> </a:t>
+            </a:r>
+            <a:r>
+              <a:rPr lang="en-US" dirty="0" smtClean="0"/>
+              <a:t>and VSAN special?</a:t>
+            </a:r>
+          </a:p>
+          <a:p>
+            <a:r>
+              <a:rPr lang="en-US" dirty="0" smtClean="0"/>
+              <a:t>They are both Software-based Storage Platforms!</a:t>
+            </a:r>
+          </a:p>
+          <a:p>
+            <a:r>
+              <a:rPr lang="en-US" dirty="0"/>
+              <a:t>No special hardware, storage array, storage controller</a:t>
+            </a:r>
+          </a:p>
+          <a:p>
+            <a:endParaRPr lang="en-US" dirty="0" smtClean="0"/>
+          </a:p>
+        </p:txBody>
+      </p:sp>
+      <p:pic>
+        <p:nvPicPr>
+          <p:cNvPr id="8" name="Picture 7"/>
+          <p:cNvPicPr>
+            <a:picLocks noChangeAspect="1"/>
+          </p:cNvPicPr>
+          <p:nvPr/>
+        </p:nvPicPr>
+        <p:blipFill>
+          <a:blip r:embed="rId2">
+            <a:extLst>
+              <a:ext uri="{28A0092B-C50C-407E-A947-70E740481C1C}">
+                <a14:useLocalDpi xmlns:a14="http://schemas.microsoft.com/office/drawing/2010/main" val="0"/>
+              </a:ext>
+            </a:extLst>
+          </a:blip>
+          <a:stretch>
+            <a:fillRect/>
+          </a:stretch>
+        </p:blipFill>
+        <p:spPr>
+          <a:xfrm>
+            <a:off x="6169572" y="905352"/>
+            <a:ext cx="2259723" cy="3543352"/>
+          </a:xfrm>
+          <a:prstGeom prst="rect">
+            <a:avLst/>
+          </a:prstGeom>
+        </p:spPr>
+      </p:pic>
     </p:spTree>
     <p:extLst>
       <p:ext uri="{BB962C8B-B14F-4D97-AF65-F5344CB8AC3E}">
-        <p14:creationId xmlns:p14="http://schemas.microsoft.com/office/powerpoint/2010/main" val="196386460"/>
+        <p14:creationId xmlns:p14="http://schemas.microsoft.com/office/powerpoint/2010/main" val="3825725477"/>
       </p:ext>
     </p:extLst>
   </p:cSld>
@@ -13199,187 +13504,30 @@
         </p:nvSpPr>
         <p:spPr/>
         <p:txBody>
-          <a:bodyPr/>
+          <a:bodyPr>
+            <a:normAutofit fontScale="90000"/>
+          </a:bodyPr>
           <a:lstStyle/>
           <a:p>
             <a:r>
               <a:rPr lang="en-US" dirty="0" smtClean="0"/>
-              <a:t>What is a Scheduler?</a:t>
+              <a:t>Container</a:t>
+            </a:r>
+            <a:br>
+              <a:rPr lang="en-US" dirty="0" smtClean="0"/>
+            </a:br>
+            <a:r>
+              <a:rPr lang="en-US" dirty="0" smtClean="0"/>
+              <a:t>Schedulers</a:t>
             </a:r>
             <a:endParaRPr lang="en-US" dirty="0"/>
           </a:p>
         </p:txBody>
       </p:sp>
-      <p:sp>
-        <p:nvSpPr>
-          <p:cNvPr id="4" name="Content Placeholder 3"/>
-          <p:cNvSpPr>
-            <a:spLocks noGrp="1"/>
-          </p:cNvSpPr>
-          <p:nvPr>
-            <p:ph sz="half" idx="1"/>
-          </p:nvPr>
-        </p:nvSpPr>
-        <p:spPr>
-          <a:xfrm>
-            <a:off x="274319" y="1280159"/>
-            <a:ext cx="4722759" cy="3455361"/>
-          </a:xfrm>
-        </p:spPr>
-        <p:txBody>
-          <a:bodyPr/>
-          <a:lstStyle/>
-          <a:p>
-            <a:r>
-              <a:rPr lang="en-US" dirty="0" smtClean="0"/>
-              <a:t>Fair and efficient workload placement</a:t>
-            </a:r>
-          </a:p>
-          <a:p>
-            <a:r>
-              <a:rPr lang="en-US" dirty="0" smtClean="0"/>
-              <a:t>Adhering to a set of constraints</a:t>
-            </a:r>
-          </a:p>
-          <a:p>
-            <a:r>
-              <a:rPr lang="en-US" dirty="0" smtClean="0"/>
-              <a:t>Quickly (and deterministically) dispatching jobs</a:t>
-            </a:r>
-          </a:p>
-          <a:p>
-            <a:r>
-              <a:rPr lang="en-US" dirty="0" smtClean="0"/>
-              <a:t>Robust and tolerates errors</a:t>
-            </a:r>
-            <a:endParaRPr lang="en-US" dirty="0"/>
-          </a:p>
-        </p:txBody>
-      </p:sp>
-      <p:pic>
-        <p:nvPicPr>
-          <p:cNvPr id="5" name="Content Placeholder 3"/>
-          <p:cNvPicPr>
-            <a:picLocks noChangeAspect="1"/>
-          </p:cNvPicPr>
-          <p:nvPr/>
-        </p:nvPicPr>
-        <p:blipFill>
-          <a:blip r:embed="rId2" cstate="print">
-            <a:extLst>
-              <a:ext uri="{28A0092B-C50C-407E-A947-70E740481C1C}">
-                <a14:useLocalDpi xmlns:a14="http://schemas.microsoft.com/office/drawing/2010/main" val="0"/>
-              </a:ext>
-            </a:extLst>
-          </a:blip>
-          <a:stretch>
-            <a:fillRect/>
-          </a:stretch>
-        </p:blipFill>
-        <p:spPr>
-          <a:xfrm>
-            <a:off x="5151382" y="1796088"/>
-            <a:ext cx="1977659" cy="925544"/>
-          </a:xfrm>
-          <a:prstGeom prst="rect">
-            <a:avLst/>
-          </a:prstGeom>
-        </p:spPr>
-      </p:pic>
-      <p:pic>
-        <p:nvPicPr>
-          <p:cNvPr id="6" name="Picture 5"/>
-          <p:cNvPicPr>
-            <a:picLocks noChangeAspect="1"/>
-          </p:cNvPicPr>
-          <p:nvPr/>
-        </p:nvPicPr>
-        <p:blipFill>
-          <a:blip r:embed="rId3" cstate="print">
-            <a:extLst>
-              <a:ext uri="{28A0092B-C50C-407E-A947-70E740481C1C}">
-                <a14:useLocalDpi xmlns:a14="http://schemas.microsoft.com/office/drawing/2010/main" val="0"/>
-              </a:ext>
-            </a:extLst>
-          </a:blip>
-          <a:stretch>
-            <a:fillRect/>
-          </a:stretch>
-        </p:blipFill>
-        <p:spPr>
-          <a:xfrm>
-            <a:off x="7245263" y="1586064"/>
-            <a:ext cx="1686514" cy="1493770"/>
-          </a:xfrm>
-          <a:prstGeom prst="rect">
-            <a:avLst/>
-          </a:prstGeom>
-        </p:spPr>
-      </p:pic>
-      <p:pic>
-        <p:nvPicPr>
-          <p:cNvPr id="7" name="Picture 6"/>
-          <p:cNvPicPr>
-            <a:picLocks noChangeAspect="1"/>
-          </p:cNvPicPr>
-          <p:nvPr/>
-        </p:nvPicPr>
-        <p:blipFill>
-          <a:blip r:embed="rId4">
-            <a:extLst>
-              <a:ext uri="{28A0092B-C50C-407E-A947-70E740481C1C}">
-                <a14:useLocalDpi xmlns:a14="http://schemas.microsoft.com/office/drawing/2010/main" val="0"/>
-              </a:ext>
-            </a:extLst>
-          </a:blip>
-          <a:stretch>
-            <a:fillRect/>
-          </a:stretch>
-        </p:blipFill>
-        <p:spPr>
-          <a:xfrm>
-            <a:off x="5040964" y="2943319"/>
-            <a:ext cx="2033286" cy="1541481"/>
-          </a:xfrm>
-          <a:prstGeom prst="rect">
-            <a:avLst/>
-          </a:prstGeom>
-        </p:spPr>
-      </p:pic>
-      <p:pic>
-        <p:nvPicPr>
-          <p:cNvPr id="8" name="Picture 7"/>
-          <p:cNvPicPr>
-            <a:picLocks noChangeAspect="1"/>
-          </p:cNvPicPr>
-          <p:nvPr/>
-        </p:nvPicPr>
-        <p:blipFill>
-          <a:blip r:embed="rId5" cstate="print">
-            <a:extLst>
-              <a:ext uri="{28A0092B-C50C-407E-A947-70E740481C1C}">
-                <a14:useLocalDpi xmlns:a14="http://schemas.microsoft.com/office/drawing/2010/main" val="0"/>
-              </a:ext>
-            </a:extLst>
-          </a:blip>
-          <a:stretch>
-            <a:fillRect/>
-          </a:stretch>
-        </p:blipFill>
-        <p:spPr>
-          <a:xfrm>
-            <a:off x="7082006" y="3278780"/>
-            <a:ext cx="1842130" cy="958265"/>
-          </a:xfrm>
-          <a:prstGeom prst="rect">
-            <a:avLst/>
-          </a:prstGeom>
-        </p:spPr>
-      </p:pic>
     </p:spTree>
     <p:extLst>
       <p:ext uri="{BB962C8B-B14F-4D97-AF65-F5344CB8AC3E}">
-        <p14:creationId xmlns:p14="http://schemas.microsoft.com/office/powerpoint/2010/main" val="1888563960"/>
+        <p14:creationId xmlns:p14="http://schemas.microsoft.com/office/powerpoint/2010/main" val="196386460"/>
       </p:ext>
     </p:extLst>
   </p:cSld>
@@ -14365,12 +14513,6 @@
 </file>
 
 <file path=customXml/item1.xml><?xml version="1.0" encoding="utf-8"?>
-<p:properties xmlns:p="http://schemas.microsoft.com/office/2006/metadata/properties" xmlns:xsi="http://www.w3.org/2001/XMLSchema-instance">
-  <documentManagement/>
-</p:properties>
-</file>
-
-<file path=customXml/item2.xml><?xml version="1.0" encoding="utf-8"?>
 <ct:contentTypeSchema xmlns:ct="http://schemas.microsoft.com/office/2006/metadata/contentType" xmlns:ma="http://schemas.microsoft.com/office/2006/metadata/properties/metaAttributes" ct:_="" ma:_="" ma:contentTypeName="Document" ma:contentTypeID="0x010100EAEEBEE83C66E54EA9BED83B0A9A60DB" ma:contentTypeVersion="1" ma:contentTypeDescription="Create a new document." ma:contentTypeScope="" ma:versionID="51a43b2161297f783d65b37e357c79e9">
   <xsd:schema xmlns:xsd="http://www.w3.org/2001/XMLSchema" xmlns:p="http://schemas.microsoft.com/office/2006/metadata/properties" targetNamespace="http://schemas.microsoft.com/office/2006/metadata/properties" ma:root="true" ma:fieldsID="b9cfef283e0bc2d986a66f9ec0cdc424">
     <xsd:element name="properties">
@@ -14419,6 +14561,12 @@
 </ct:contentTypeSchema>
 </file>
 
+<file path=customXml/item2.xml><?xml version="1.0" encoding="utf-8"?>
+<p:properties xmlns:p="http://schemas.microsoft.com/office/2006/metadata/properties" xmlns:xsi="http://www.w3.org/2001/XMLSchema-instance">
+  <documentManagement/>
+</p:properties>
+</file>
+
 <file path=customXml/item3.xml><?xml version="1.0" encoding="utf-8"?>
 <?mso-contentType ?>
 <FormTemplates xmlns="http://schemas.microsoft.com/sharepoint/v3/contenttype/forms">
@@ -14429,20 +14577,6 @@
 </file>
 
 <file path=customXml/itemProps1.xml><?xml version="1.0" encoding="utf-8"?>
-<ds:datastoreItem xmlns:ds="http://schemas.openxmlformats.org/officeDocument/2006/customXml" ds:itemID="{0873BDD3-AA35-4F19-A12A-C6462BECFBD1}">
-  <ds:schemaRefs>
-    <ds:schemaRef ds:uri="http://purl.org/dc/dcmitype/"/>
-    <ds:schemaRef ds:uri="http://purl.org/dc/elements/1.1/"/>
-    <ds:schemaRef ds:uri="http://schemas.microsoft.com/office/2006/documentManagement/types"/>
-    <ds:schemaRef ds:uri="http://purl.org/dc/terms/"/>
-    <ds:schemaRef ds:uri="http://schemas.openxmlformats.org/package/2006/metadata/core-properties"/>
-    <ds:schemaRef ds:uri="http://schemas.microsoft.com/office/2006/metadata/properties"/>
-    <ds:schemaRef ds:uri="http://www.w3.org/XML/1998/namespace"/>
-  </ds:schemaRefs>
-</ds:datastoreItem>
-</file>
-
-<file path=customXml/itemProps2.xml><?xml version="1.0" encoding="utf-8"?>
 <ds:datastoreItem xmlns:ds="http://schemas.openxmlformats.org/officeDocument/2006/customXml" ds:itemID="{A3332CB6-AB82-4DD3-8C89-C660A1C3944B}">
   <ds:schemaRefs>
     <ds:schemaRef ds:uri="http://schemas.microsoft.com/office/2006/metadata/contentType"/>
@@ -14457,6 +14591,20 @@
 </ds:datastoreItem>
 </file>
 
+<file path=customXml/itemProps2.xml><?xml version="1.0" encoding="utf-8"?>
+<ds:datastoreItem xmlns:ds="http://schemas.openxmlformats.org/officeDocument/2006/customXml" ds:itemID="{0873BDD3-AA35-4F19-A12A-C6462BECFBD1}">
+  <ds:schemaRefs>
+    <ds:schemaRef ds:uri="http://purl.org/dc/dcmitype/"/>
+    <ds:schemaRef ds:uri="http://purl.org/dc/elements/1.1/"/>
+    <ds:schemaRef ds:uri="http://schemas.microsoft.com/office/2006/documentManagement/types"/>
+    <ds:schemaRef ds:uri="http://purl.org/dc/terms/"/>
+    <ds:schemaRef ds:uri="http://schemas.openxmlformats.org/package/2006/metadata/core-properties"/>
+    <ds:schemaRef ds:uri="http://schemas.microsoft.com/office/2006/metadata/properties"/>
+    <ds:schemaRef ds:uri="http://www.w3.org/XML/1998/namespace"/>
+  </ds:schemaRefs>
+</ds:datastoreItem>
+</file>
+
 <file path=customXml/itemProps3.xml><?xml version="1.0" encoding="utf-8"?>
 <ds:datastoreItem xmlns:ds="http://schemas.openxmlformats.org/officeDocument/2006/customXml" ds:itemID="{86FC490B-1F77-48C5-AC70-1DD939DBDF04}">
   <ds:schemaRefs>

</xml_diff>

<commit_message>
Update to SCaLE presentation
</commit_message>
<xml_diff>
--- a/2017_SCALE15/SCaLE-ConSchedAndSDSChangeCloud-PDF.pptx
+++ b/2017_SCALE15/SCaLE-ConSchedAndSDSChangeCloud-PDF.pptx
@@ -13,12 +13,12 @@
   <p:sldIdLst>
     <p:sldId id="307" r:id="rId5"/>
     <p:sldId id="325" r:id="rId6"/>
-    <p:sldId id="344" r:id="rId7"/>
-    <p:sldId id="382" r:id="rId8"/>
-    <p:sldId id="342" r:id="rId9"/>
+    <p:sldId id="385" r:id="rId7"/>
+    <p:sldId id="386" r:id="rId8"/>
+    <p:sldId id="387" r:id="rId9"/>
     <p:sldId id="380" r:id="rId10"/>
     <p:sldId id="381" r:id="rId11"/>
-    <p:sldId id="383" r:id="rId12"/>
+    <p:sldId id="388" r:id="rId12"/>
     <p:sldId id="319" r:id="rId13"/>
     <p:sldId id="367" r:id="rId14"/>
     <p:sldId id="372" r:id="rId15"/>
@@ -786,47 +786,12 @@
           <a:p>
             <a:r>
               <a:rPr lang="en-US" dirty="0" smtClean="0"/>
-              <a:t>Is a Container Scheduler</a:t>
-            </a:r>
-          </a:p>
-          <a:p>
+              <a:t>Other forms of Software Defined Storage may need a physical appliance</a:t>
+            </a:r>
             <a:r>
               <a:rPr lang="en-US" baseline="0" dirty="0" smtClean="0"/>
-              <a:t>  - </a:t>
-            </a:r>
-            <a:r>
-              <a:rPr lang="en-US" dirty="0" smtClean="0"/>
-              <a:t>Docker</a:t>
-            </a:r>
-          </a:p>
-          <a:p>
-            <a:r>
-              <a:rPr lang="en-US" baseline="0" smtClean="0"/>
-              <a:t>  - </a:t>
-            </a:r>
-            <a:r>
-              <a:rPr lang="en-US" smtClean="0"/>
-              <a:t>Unified </a:t>
-            </a:r>
-            <a:r>
-              <a:rPr lang="en-US" dirty="0" err="1" smtClean="0"/>
-              <a:t>Containerizer</a:t>
-            </a:r>
-            <a:endParaRPr lang="en-US" dirty="0" smtClean="0"/>
-          </a:p>
-          <a:p>
-            <a:r>
-              <a:rPr lang="en-US" dirty="0" smtClean="0"/>
-              <a:t>Task placement based on CPU, Memory, and Disk</a:t>
-            </a:r>
-          </a:p>
-          <a:p>
-            <a:r>
-              <a:rPr lang="en-US" dirty="0" smtClean="0"/>
-              <a:t>User defined constraints</a:t>
-            </a:r>
-          </a:p>
-          <a:p>
+              <a:t> or require some purpose built hardware. NFS and VSAN do not. I am going to touch on this a little more later.</a:t>
+            </a:r>
             <a:endParaRPr lang="en-US" dirty="0"/>
           </a:p>
         </p:txBody>
@@ -854,7 +819,7 @@
               <a:pPr>
                 <a:defRPr/>
               </a:pPr>
-              <a:t>13</a:t>
+              <a:t>8</a:t>
             </a:fld>
             <a:endParaRPr lang="en-US" dirty="0"/>
           </a:p>
@@ -863,7 +828,7 @@
     </p:spTree>
     <p:extLst>
       <p:ext uri="{BB962C8B-B14F-4D97-AF65-F5344CB8AC3E}">
-        <p14:creationId xmlns:p14="http://schemas.microsoft.com/office/powerpoint/2010/main" val="2738618154"/>
+        <p14:creationId xmlns:p14="http://schemas.microsoft.com/office/powerpoint/2010/main" val="49602665"/>
       </p:ext>
     </p:extLst>
   </p:cSld>
@@ -917,6 +882,49 @@
           <a:bodyPr/>
           <a:lstStyle/>
           <a:p>
+            <a:r>
+              <a:rPr lang="en-US" dirty="0" smtClean="0"/>
+              <a:t>Is a Container Scheduler</a:t>
+            </a:r>
+          </a:p>
+          <a:p>
+            <a:r>
+              <a:rPr lang="en-US" baseline="0" dirty="0" smtClean="0"/>
+              <a:t>  - </a:t>
+            </a:r>
+            <a:r>
+              <a:rPr lang="en-US" dirty="0" smtClean="0"/>
+              <a:t>Docker</a:t>
+            </a:r>
+          </a:p>
+          <a:p>
+            <a:r>
+              <a:rPr lang="en-US" baseline="0" smtClean="0"/>
+              <a:t>  - </a:t>
+            </a:r>
+            <a:r>
+              <a:rPr lang="en-US" smtClean="0"/>
+              <a:t>Unified </a:t>
+            </a:r>
+            <a:r>
+              <a:rPr lang="en-US" dirty="0" err="1" smtClean="0"/>
+              <a:t>Containerizer</a:t>
+            </a:r>
+            <a:endParaRPr lang="en-US" dirty="0" smtClean="0"/>
+          </a:p>
+          <a:p>
+            <a:r>
+              <a:rPr lang="en-US" dirty="0" smtClean="0"/>
+              <a:t>Task placement based on CPU, Memory, and Disk</a:t>
+            </a:r>
+          </a:p>
+          <a:p>
+            <a:r>
+              <a:rPr lang="en-US" dirty="0" smtClean="0"/>
+              <a:t>User defined constraints</a:t>
+            </a:r>
+          </a:p>
+          <a:p>
             <a:endParaRPr lang="en-US" dirty="0"/>
           </a:p>
         </p:txBody>
@@ -944,7 +952,7 @@
               <a:pPr>
                 <a:defRPr/>
               </a:pPr>
-              <a:t>19</a:t>
+              <a:t>13</a:t>
             </a:fld>
             <a:endParaRPr lang="en-US" dirty="0"/>
           </a:p>
@@ -953,7 +961,7 @@
     </p:spTree>
     <p:extLst>
       <p:ext uri="{BB962C8B-B14F-4D97-AF65-F5344CB8AC3E}">
-        <p14:creationId xmlns:p14="http://schemas.microsoft.com/office/powerpoint/2010/main" val="1598682365"/>
+        <p14:creationId xmlns:p14="http://schemas.microsoft.com/office/powerpoint/2010/main" val="2738618154"/>
       </p:ext>
     </p:extLst>
   </p:cSld>
@@ -1034,6 +1042,96 @@
               <a:pPr>
                 <a:defRPr/>
               </a:pPr>
+              <a:t>19</a:t>
+            </a:fld>
+            <a:endParaRPr lang="en-US" dirty="0"/>
+          </a:p>
+        </p:txBody>
+      </p:sp>
+    </p:spTree>
+    <p:extLst>
+      <p:ext uri="{BB962C8B-B14F-4D97-AF65-F5344CB8AC3E}">
+        <p14:creationId xmlns:p14="http://schemas.microsoft.com/office/powerpoint/2010/main" val="1598682365"/>
+      </p:ext>
+    </p:extLst>
+  </p:cSld>
+  <p:clrMapOvr>
+    <a:masterClrMapping/>
+  </p:clrMapOvr>
+</p:notes>
+</file>
+
+<file path=ppt/notesSlides/notesSlide4.xml><?xml version="1.0" encoding="utf-8"?>
+<p:notes xmlns:a="http://schemas.openxmlformats.org/drawingml/2006/main" xmlns:r="http://schemas.openxmlformats.org/officeDocument/2006/relationships" xmlns:p="http://schemas.openxmlformats.org/presentationml/2006/main">
+  <p:cSld>
+    <p:spTree>
+      <p:nvGrpSpPr>
+        <p:cNvPr id="1" name=""/>
+        <p:cNvGrpSpPr/>
+        <p:nvPr/>
+      </p:nvGrpSpPr>
+      <p:grpSpPr>
+        <a:xfrm>
+          <a:off x="0" y="0"/>
+          <a:ext cx="0" cy="0"/>
+          <a:chOff x="0" y="0"/>
+          <a:chExt cx="0" cy="0"/>
+        </a:xfrm>
+      </p:grpSpPr>
+      <p:sp>
+        <p:nvSpPr>
+          <p:cNvPr id="2" name="Slide Image Placeholder 1"/>
+          <p:cNvSpPr>
+            <a:spLocks noGrp="1" noRot="1" noChangeAspect="1"/>
+          </p:cNvSpPr>
+          <p:nvPr>
+            <p:ph type="sldImg"/>
+          </p:nvPr>
+        </p:nvSpPr>
+        <p:spPr/>
+      </p:sp>
+      <p:sp>
+        <p:nvSpPr>
+          <p:cNvPr id="3" name="Notes Placeholder 2"/>
+          <p:cNvSpPr>
+            <a:spLocks noGrp="1"/>
+          </p:cNvSpPr>
+          <p:nvPr>
+            <p:ph type="body" idx="1"/>
+          </p:nvPr>
+        </p:nvSpPr>
+        <p:spPr/>
+        <p:txBody>
+          <a:bodyPr/>
+          <a:lstStyle/>
+          <a:p>
+            <a:endParaRPr lang="en-US" dirty="0"/>
+          </a:p>
+        </p:txBody>
+      </p:sp>
+      <p:sp>
+        <p:nvSpPr>
+          <p:cNvPr id="4" name="Slide Number Placeholder 3"/>
+          <p:cNvSpPr>
+            <a:spLocks noGrp="1"/>
+          </p:cNvSpPr>
+          <p:nvPr>
+            <p:ph type="sldNum" sz="quarter" idx="10"/>
+          </p:nvPr>
+        </p:nvSpPr>
+        <p:spPr/>
+        <p:txBody>
+          <a:bodyPr/>
+          <a:lstStyle/>
+          <a:p>
+            <a:pPr>
+              <a:defRPr/>
+            </a:pPr>
+            <a:fld id="{FA04BB6B-BEDE-48E4-970F-8DFC0D4B5AE7}" type="slidenum">
+              <a:rPr lang="en-US" smtClean="0"/>
+              <a:pPr>
+                <a:defRPr/>
+              </a:pPr>
               <a:t>26</a:t>
             </a:fld>
             <a:endParaRPr lang="en-US" dirty="0"/>
@@ -1053,7 +1151,7 @@
 </p:notes>
 </file>
 
-<file path=ppt/notesSlides/notesSlide4.xml><?xml version="1.0" encoding="utf-8"?>
+<file path=ppt/notesSlides/notesSlide5.xml><?xml version="1.0" encoding="utf-8"?>
 <p:notes xmlns:a="http://schemas.openxmlformats.org/drawingml/2006/main" xmlns:r="http://schemas.openxmlformats.org/officeDocument/2006/relationships" xmlns:p="http://schemas.openxmlformats.org/presentationml/2006/main">
   <p:cSld>
     <p:spTree>
@@ -5556,7 +5654,7 @@
                   <a:schemeClr val="bg1"/>
                 </a:buClr>
               </a:pPr>
-              <a:t>2/23/2017</a:t>
+              <a:t>3/5/17</a:t>
             </a:fld>
             <a:endParaRPr lang="en-US" sz="900" dirty="0" smtClean="0">
               <a:solidFill>
@@ -5630,7 +5728,7 @@
                   <a:schemeClr val="bg1"/>
                 </a:buClr>
               </a:pPr>
-              <a:t>2/23/2017</a:t>
+              <a:t>3/5/17</a:t>
             </a:fld>
             <a:endParaRPr lang="en-US" sz="900" dirty="0" smtClean="0">
               <a:solidFill>
@@ -11154,13 +11252,6 @@
           <a:p>
             <a:r>
               <a:rPr lang="en-US" dirty="0" smtClean="0"/>
-              <a:t>Review of</a:t>
-            </a:r>
-            <a:br>
-              <a:rPr lang="en-US" dirty="0" smtClean="0"/>
-            </a:br>
-            <a:r>
-              <a:rPr lang="en-US" dirty="0" smtClean="0"/>
               <a:t>Software-Defined Storage</a:t>
             </a:r>
             <a:endParaRPr lang="en-US" dirty="0"/>
@@ -11170,7 +11261,7 @@
     </p:spTree>
     <p:extLst>
       <p:ext uri="{BB962C8B-B14F-4D97-AF65-F5344CB8AC3E}">
-        <p14:creationId xmlns:p14="http://schemas.microsoft.com/office/powerpoint/2010/main" val="1421875214"/>
+        <p14:creationId xmlns:p14="http://schemas.microsoft.com/office/powerpoint/2010/main" val="1520334499"/>
       </p:ext>
     </p:extLst>
   </p:cSld>
@@ -13005,18 +13096,12 @@
               <a:t>Varying degrees of SDS: NFS, VMware VSAN</a:t>
             </a:r>
           </a:p>
-          <a:p>
-            <a:r>
-              <a:rPr lang="en-US" dirty="0" smtClean="0"/>
-              <a:t>NFS, VSAN are Software-based Storage Platforms!</a:t>
-            </a:r>
-          </a:p>
         </p:txBody>
       </p:sp>
     </p:spTree>
     <p:extLst>
       <p:ext uri="{BB962C8B-B14F-4D97-AF65-F5344CB8AC3E}">
-        <p14:creationId xmlns:p14="http://schemas.microsoft.com/office/powerpoint/2010/main" val="3505936002"/>
+        <p14:creationId xmlns:p14="http://schemas.microsoft.com/office/powerpoint/2010/main" val="1501492687"/>
       </p:ext>
     </p:extLst>
   </p:cSld>
@@ -13097,7 +13182,7 @@
             </a:r>
             <a:r>
               <a:rPr lang="en-US" dirty="0" smtClean="0"/>
-              <a:t>perational - Manage provisioning and data independent of underlying hardware</a:t>
+              <a:t>perational - Manage provisioning process and data independent of underlying hardware</a:t>
             </a:r>
           </a:p>
           <a:p>
@@ -13124,7 +13209,7 @@
     </p:spTree>
     <p:extLst>
       <p:ext uri="{BB962C8B-B14F-4D97-AF65-F5344CB8AC3E}">
-        <p14:creationId xmlns:p14="http://schemas.microsoft.com/office/powerpoint/2010/main" val="1768916715"/>
+        <p14:creationId xmlns:p14="http://schemas.microsoft.com/office/powerpoint/2010/main" val="2063988241"/>
       </p:ext>
     </p:extLst>
   </p:cSld>
@@ -13414,7 +13499,15 @@
           <a:p>
             <a:r>
               <a:rPr lang="en-US" dirty="0"/>
-              <a:t>No special hardware, storage array, storage controller</a:t>
+              <a:t>No special hardware, </a:t>
+            </a:r>
+            <a:r>
+              <a:rPr lang="en-US" dirty="0" smtClean="0"/>
+              <a:t>purpose built appliance, storage </a:t>
+            </a:r>
+            <a:r>
+              <a:rPr lang="en-US" dirty="0"/>
+              <a:t>array, storage controller</a:t>
             </a:r>
           </a:p>
           <a:p>
@@ -13431,7 +13524,7 @@
           <p:nvPr/>
         </p:nvPicPr>
         <p:blipFill>
-          <a:blip r:embed="rId2">
+          <a:blip r:embed="rId3">
             <a:extLst>
               <a:ext uri="{28A0092B-C50C-407E-A947-70E740481C1C}">
                 <a14:useLocalDpi xmlns:a14="http://schemas.microsoft.com/office/drawing/2010/main" val="0"/>
@@ -13455,7 +13548,7 @@
     </p:spTree>
     <p:extLst>
       <p:ext uri="{BB962C8B-B14F-4D97-AF65-F5344CB8AC3E}">
-        <p14:creationId xmlns:p14="http://schemas.microsoft.com/office/powerpoint/2010/main" val="3825725477"/>
+        <p14:creationId xmlns:p14="http://schemas.microsoft.com/office/powerpoint/2010/main" val="1820131740"/>
       </p:ext>
     </p:extLst>
   </p:cSld>

</xml_diff>